<commit_message>
Rearranged sections & update object detection slot
</commit_message>
<xml_diff>
--- a/554_Poster.pptx
+++ b/554_Poster.pptx
@@ -543,7 +543,7 @@
               <a:pPr>
                 <a:defRPr/>
               </a:pPr>
-              <a:t>4/15/25</a:t>
+              <a:t>4/17/25</a:t>
             </a:fld>
             <a:endParaRPr lang="en-US" altLang="en-US"/>
           </a:p>
@@ -2038,6 +2038,66 @@
           <a:chExt cx="0" cy="0"/>
         </a:xfrm>
       </p:grpSpPr>
+      <p:pic>
+        <p:nvPicPr>
+          <p:cNvPr id="53" name="Picture 52">
+            <a:extLst>
+              <a:ext uri="{FF2B5EF4-FFF2-40B4-BE49-F238E27FC236}">
+                <a16:creationId xmlns:a16="http://schemas.microsoft.com/office/drawing/2014/main" id="{B3ABFFC3-9B9E-7E08-EB5F-7F918B8FB88B}"/>
+              </a:ext>
+            </a:extLst>
+          </p:cNvPr>
+          <p:cNvPicPr>
+            <a:picLocks noChangeAspect="1"/>
+          </p:cNvPicPr>
+          <p:nvPr/>
+        </p:nvPicPr>
+        <p:blipFill>
+          <a:blip r:embed="rId3"/>
+          <a:stretch>
+            <a:fillRect/>
+          </a:stretch>
+        </p:blipFill>
+        <p:spPr>
+          <a:xfrm>
+            <a:off x="13902604" y="11269963"/>
+            <a:ext cx="6224873" cy="4107436"/>
+          </a:xfrm>
+          <a:prstGeom prst="rect">
+            <a:avLst/>
+          </a:prstGeom>
+        </p:spPr>
+      </p:pic>
+      <p:pic>
+        <p:nvPicPr>
+          <p:cNvPr id="48" name="Picture 47" descr="A diagram of a column readout direction&#10;&#10;AI-generated content may be incorrect.">
+            <a:extLst>
+              <a:ext uri="{FF2B5EF4-FFF2-40B4-BE49-F238E27FC236}">
+                <a16:creationId xmlns:a16="http://schemas.microsoft.com/office/drawing/2014/main" id="{F60351EB-178C-6D58-A486-95971F8817E9}"/>
+              </a:ext>
+            </a:extLst>
+          </p:cNvPr>
+          <p:cNvPicPr>
+            <a:picLocks noChangeAspect="1"/>
+          </p:cNvPicPr>
+          <p:nvPr/>
+        </p:nvPicPr>
+        <p:blipFill>
+          <a:blip r:embed="rId4"/>
+          <a:stretch>
+            <a:fillRect/>
+          </a:stretch>
+        </p:blipFill>
+        <p:spPr>
+          <a:xfrm>
+            <a:off x="18909887" y="6584804"/>
+            <a:ext cx="6787183" cy="4156371"/>
+          </a:xfrm>
+          <a:prstGeom prst="rect">
+            <a:avLst/>
+          </a:prstGeom>
+        </p:spPr>
+      </p:pic>
       <p:sp>
         <p:nvSpPr>
           <p:cNvPr id="2" name="Rectangle 1">
@@ -3186,7 +3246,7 @@
                 <a:latin typeface="Arial" panose="020B0604020202020204" pitchFamily="34" charset="0"/>
                 <a:cs typeface="Arial" panose="020B0604020202020204" pitchFamily="34" charset="0"/>
               </a:rPr>
-              <a:t>Translation Layer</a:t>
+              <a:t>Object Detection</a:t>
             </a:r>
           </a:p>
         </p:txBody>
@@ -3427,66 +3487,6 @@
                 <a:cs typeface="Arial" panose="020B0604020202020204" pitchFamily="34" charset="0"/>
               </a:rPr>
               <a:t>Servo Driver</a:t>
-            </a:r>
-          </a:p>
-        </p:txBody>
-      </p:sp>
-      <p:sp>
-        <p:nvSpPr>
-          <p:cNvPr id="202" name="Rectangle 201">
-            <a:extLst>
-              <a:ext uri="{FF2B5EF4-FFF2-40B4-BE49-F238E27FC236}">
-                <a16:creationId xmlns:a16="http://schemas.microsoft.com/office/drawing/2014/main" id="{110B25B3-C233-456E-8EBD-1270B4BBA2F5}"/>
-              </a:ext>
-            </a:extLst>
-          </p:cNvPr>
-          <p:cNvSpPr/>
-          <p:nvPr/>
-        </p:nvSpPr>
-        <p:spPr>
-          <a:xfrm>
-            <a:off x="13817880" y="17642452"/>
-            <a:ext cx="11875167" cy="1381994"/>
-          </a:xfrm>
-          <a:prstGeom prst="rect">
-            <a:avLst/>
-          </a:prstGeom>
-          <a:solidFill>
-            <a:srgbClr val="C5050C"/>
-          </a:solidFill>
-          <a:ln>
-            <a:noFill/>
-          </a:ln>
-          <a:effectLst/>
-        </p:spPr>
-        <p:style>
-          <a:lnRef idx="1">
-            <a:schemeClr val="accent1"/>
-          </a:lnRef>
-          <a:fillRef idx="3">
-            <a:schemeClr val="accent1"/>
-          </a:fillRef>
-          <a:effectRef idx="2">
-            <a:schemeClr val="accent1"/>
-          </a:effectRef>
-          <a:fontRef idx="minor">
-            <a:schemeClr val="lt1"/>
-          </a:fontRef>
-        </p:style>
-        <p:txBody>
-          <a:bodyPr rtlCol="0" anchor="ctr"/>
-          <a:lstStyle/>
-          <a:p>
-            <a:pPr algn="ctr"/>
-            <a:r>
-              <a:rPr lang="en-US" sz="5733" b="1" dirty="0">
-                <a:solidFill>
-                  <a:schemeClr val="bg1"/>
-                </a:solidFill>
-                <a:latin typeface="Arial" panose="020B0604020202020204" pitchFamily="34" charset="0"/>
-                <a:cs typeface="Arial" panose="020B0604020202020204" pitchFamily="34" charset="0"/>
-              </a:rPr>
-              <a:t>Optimizations</a:t>
             </a:r>
           </a:p>
         </p:txBody>
@@ -3719,8 +3719,8 @@
         </p:nvSpPr>
         <p:spPr>
           <a:xfrm>
-            <a:off x="13886544" y="4963152"/>
-            <a:ext cx="11840835" cy="12463070"/>
+            <a:off x="13886544" y="4963151"/>
+            <a:ext cx="11840835" cy="25897847"/>
           </a:xfrm>
           <a:prstGeom prst="rect">
             <a:avLst/>
@@ -3884,65 +3884,6 @@
       </p:sp>
       <p:sp>
         <p:nvSpPr>
-          <p:cNvPr id="11" name="Rectangle 10">
-            <a:extLst>
-              <a:ext uri="{FF2B5EF4-FFF2-40B4-BE49-F238E27FC236}">
-                <a16:creationId xmlns:a16="http://schemas.microsoft.com/office/drawing/2014/main" id="{7CB3CF86-FED8-D0E9-C75A-D2EDD506E553}"/>
-              </a:ext>
-            </a:extLst>
-          </p:cNvPr>
-          <p:cNvSpPr/>
-          <p:nvPr/>
-        </p:nvSpPr>
-        <p:spPr>
-          <a:xfrm>
-            <a:off x="13852212" y="17642452"/>
-            <a:ext cx="11840835" cy="13218547"/>
-          </a:xfrm>
-          <a:prstGeom prst="rect">
-            <a:avLst/>
-          </a:prstGeom>
-          <a:noFill/>
-          <a:ln w="38100">
-            <a:solidFill>
-              <a:schemeClr val="accent1">
-                <a:shade val="15000"/>
-              </a:schemeClr>
-            </a:solidFill>
-          </a:ln>
-          <a:effectLst/>
-        </p:spPr>
-        <p:style>
-          <a:lnRef idx="1">
-            <a:schemeClr val="accent1"/>
-          </a:lnRef>
-          <a:fillRef idx="3">
-            <a:schemeClr val="accent1"/>
-          </a:fillRef>
-          <a:effectRef idx="2">
-            <a:schemeClr val="accent1"/>
-          </a:effectRef>
-          <a:fontRef idx="minor">
-            <a:schemeClr val="lt1"/>
-          </a:fontRef>
-        </p:style>
-        <p:txBody>
-          <a:bodyPr rtlCol="0" anchor="ctr"/>
-          <a:lstStyle/>
-          <a:p>
-            <a:pPr algn="ctr"/>
-            <a:endParaRPr lang="en-US" sz="3344" b="1" dirty="0">
-              <a:solidFill>
-                <a:schemeClr val="bg1"/>
-              </a:solidFill>
-              <a:latin typeface="Arial" panose="020B0604020202020204" pitchFamily="34" charset="0"/>
-              <a:cs typeface="Arial" panose="020B0604020202020204" pitchFamily="34" charset="0"/>
-            </a:endParaRPr>
-          </a:p>
-        </p:txBody>
-      </p:sp>
-      <p:sp>
-        <p:nvSpPr>
           <p:cNvPr id="13" name="TextBox 12">
             <a:extLst>
               <a:ext uri="{FF2B5EF4-FFF2-40B4-BE49-F238E27FC236}">
@@ -3991,7 +3932,7 @@
                 <a:latin typeface="Arial" panose="020B0604020202020204" pitchFamily="34" charset="0"/>
                 <a:cs typeface="Arial" panose="020B0604020202020204" pitchFamily="34" charset="0"/>
               </a:rPr>
-              <a:t>Palestinian School Seeker</a:t>
+              <a:t>School Seeker</a:t>
             </a:r>
           </a:p>
         </p:txBody>
@@ -4264,6 +4205,376 @@
           <a:lstStyle/>
           <a:p>
             <a:endParaRPr lang="en-US" dirty="0"/>
+          </a:p>
+        </p:txBody>
+      </p:sp>
+      <p:sp>
+        <p:nvSpPr>
+          <p:cNvPr id="29" name="TextBox 28">
+            <a:extLst>
+              <a:ext uri="{FF2B5EF4-FFF2-40B4-BE49-F238E27FC236}">
+                <a16:creationId xmlns:a16="http://schemas.microsoft.com/office/drawing/2014/main" id="{032204A1-1042-2D62-55F4-B743EC1AF0EB}"/>
+              </a:ext>
+            </a:extLst>
+          </p:cNvPr>
+          <p:cNvSpPr txBox="1"/>
+          <p:nvPr/>
+        </p:nvSpPr>
+        <p:spPr>
+          <a:xfrm>
+            <a:off x="15412230" y="26514623"/>
+            <a:ext cx="8305800" cy="2481064"/>
+          </a:xfrm>
+          <a:prstGeom prst="rect">
+            <a:avLst/>
+          </a:prstGeom>
+          <a:noFill/>
+        </p:spPr>
+        <p:txBody>
+          <a:bodyPr wrap="square" rtlCol="0">
+            <a:spAutoFit/>
+          </a:bodyPr>
+          <a:lstStyle/>
+          <a:p>
+            <a:pPr marL="514350" indent="-514350">
+              <a:buAutoNum type="arabicPeriod"/>
+            </a:pPr>
+            <a:r>
+              <a:rPr lang="en-US" dirty="0"/>
+              <a:t>Went from YOLO algorithm &amp; Color tracking to singular pixel tracking</a:t>
+            </a:r>
+          </a:p>
+          <a:p>
+            <a:pPr marL="514350" indent="-514350">
+              <a:buAutoNum type="arabicPeriod"/>
+            </a:pPr>
+            <a:r>
+              <a:rPr lang="en-US" dirty="0"/>
+              <a:t>Went from differencing every other frame to every frame by shrinking buffers in half, losing half the pixels stored, to store every frame to compare. </a:t>
+            </a:r>
+          </a:p>
+          <a:p>
+            <a:pPr marL="514350" indent="-514350">
+              <a:buAutoNum type="arabicPeriod"/>
+            </a:pPr>
+            <a:endParaRPr lang="en-US" dirty="0"/>
+          </a:p>
+        </p:txBody>
+      </p:sp>
+      <p:sp>
+        <p:nvSpPr>
+          <p:cNvPr id="33" name="TextBox 32">
+            <a:extLst>
+              <a:ext uri="{FF2B5EF4-FFF2-40B4-BE49-F238E27FC236}">
+                <a16:creationId xmlns:a16="http://schemas.microsoft.com/office/drawing/2014/main" id="{F62622DF-A928-9BDE-63FF-F4FEDC6CE28E}"/>
+              </a:ext>
+            </a:extLst>
+          </p:cNvPr>
+          <p:cNvSpPr txBox="1"/>
+          <p:nvPr/>
+        </p:nvSpPr>
+        <p:spPr>
+          <a:xfrm>
+            <a:off x="20265835" y="11127677"/>
+            <a:ext cx="5184965" cy="4471673"/>
+          </a:xfrm>
+          <a:prstGeom prst="rect">
+            <a:avLst/>
+          </a:prstGeom>
+          <a:noFill/>
+        </p:spPr>
+        <p:txBody>
+          <a:bodyPr wrap="square" rtlCol="0">
+            <a:spAutoFit/>
+          </a:bodyPr>
+          <a:lstStyle/>
+          <a:p>
+            <a:r>
+              <a:rPr lang="en-US" dirty="0"/>
+              <a:t>The pixel readout from the camera to the VGA controller happens at the rising edge of PIXLCLK. To determine whether a complete frame has been shown, we need to detect the falling edge of FRAME_VALID, as shown in Figure 2. With this information, we decided on a simple frame differencing formula (Figure 3) for determining whether there was a moving object in the camera or not.</a:t>
+            </a:r>
+          </a:p>
+        </p:txBody>
+      </p:sp>
+      <p:sp>
+        <p:nvSpPr>
+          <p:cNvPr id="37" name="TextBox 36">
+            <a:extLst>
+              <a:ext uri="{FF2B5EF4-FFF2-40B4-BE49-F238E27FC236}">
+                <a16:creationId xmlns:a16="http://schemas.microsoft.com/office/drawing/2014/main" id="{D4C48F06-6BA1-A8AA-7EAC-DE75E40A8950}"/>
+              </a:ext>
+            </a:extLst>
+          </p:cNvPr>
+          <p:cNvSpPr txBox="1"/>
+          <p:nvPr/>
+        </p:nvSpPr>
+        <p:spPr>
+          <a:xfrm>
+            <a:off x="16791658" y="15364262"/>
+            <a:ext cx="1298753" cy="490455"/>
+          </a:xfrm>
+          <a:prstGeom prst="rect">
+            <a:avLst/>
+          </a:prstGeom>
+          <a:noFill/>
+        </p:spPr>
+        <p:txBody>
+          <a:bodyPr wrap="none" rtlCol="0">
+            <a:spAutoFit/>
+          </a:bodyPr>
+          <a:lstStyle/>
+          <a:p>
+            <a:r>
+              <a:rPr lang="en-US" dirty="0"/>
+              <a:t>Figure 2</a:t>
+            </a:r>
+          </a:p>
+        </p:txBody>
+      </p:sp>
+      <mc:AlternateContent xmlns:mc="http://schemas.openxmlformats.org/markup-compatibility/2006">
+        <mc:Choice xmlns:a14="http://schemas.microsoft.com/office/drawing/2010/main" Requires="a14">
+          <p:sp>
+            <p:nvSpPr>
+              <p:cNvPr id="42" name="TextBox 41">
+                <a:extLst>
+                  <a:ext uri="{FF2B5EF4-FFF2-40B4-BE49-F238E27FC236}">
+                    <a16:creationId xmlns:a16="http://schemas.microsoft.com/office/drawing/2014/main" id="{BCE854C1-EF1E-A3D6-20EA-422E25B5833C}"/>
+                  </a:ext>
+                </a:extLst>
+              </p:cNvPr>
+              <p:cNvSpPr txBox="1"/>
+              <p:nvPr/>
+            </p:nvSpPr>
+            <p:spPr>
+              <a:xfrm>
+                <a:off x="18214236" y="15841580"/>
+                <a:ext cx="2890728" cy="490455"/>
+              </a:xfrm>
+              <a:prstGeom prst="rect">
+                <a:avLst/>
+              </a:prstGeom>
+              <a:noFill/>
+            </p:spPr>
+            <p:txBody>
+              <a:bodyPr wrap="none" rtlCol="0">
+                <a:spAutoFit/>
+              </a:bodyPr>
+              <a:lstStyle/>
+              <a:p>
+                <a14:m>
+                  <m:oMathPara xmlns:m="http://schemas.openxmlformats.org/officeDocument/2006/math">
+                    <m:oMathParaPr>
+                      <m:jc m:val="centerGroup"/>
+                    </m:oMathParaPr>
+                    <m:oMath xmlns:m="http://schemas.openxmlformats.org/officeDocument/2006/math">
+                      <m:r>
+                        <a:rPr lang="en-US" b="0" i="1" smtClean="0">
+                          <a:latin typeface="Cambria Math" panose="02040503050406030204" pitchFamily="18" charset="0"/>
+                        </a:rPr>
+                        <m:t>𝐸𝑄𝑈𝐴𝑇𝐼𝑂𝑁</m:t>
+                      </m:r>
+                      <m:r>
+                        <a:rPr lang="en-US" b="0" i="1" smtClean="0">
+                          <a:latin typeface="Cambria Math" panose="02040503050406030204" pitchFamily="18" charset="0"/>
+                        </a:rPr>
+                        <m:t> </m:t>
+                      </m:r>
+                      <m:r>
+                        <a:rPr lang="en-US" b="0" i="1" smtClean="0">
+                          <a:latin typeface="Cambria Math" panose="02040503050406030204" pitchFamily="18" charset="0"/>
+                        </a:rPr>
+                        <m:t>𝐻𝐸𝑅𝐸</m:t>
+                      </m:r>
+                    </m:oMath>
+                  </m:oMathPara>
+                </a14:m>
+                <a:endParaRPr lang="en-US" dirty="0"/>
+              </a:p>
+            </p:txBody>
+          </p:sp>
+        </mc:Choice>
+        <mc:Fallback>
+          <p:sp>
+            <p:nvSpPr>
+              <p:cNvPr id="42" name="TextBox 41">
+                <a:extLst>
+                  <a:ext uri="{FF2B5EF4-FFF2-40B4-BE49-F238E27FC236}">
+                    <a16:creationId xmlns:a16="http://schemas.microsoft.com/office/drawing/2014/main" id="{BCE854C1-EF1E-A3D6-20EA-422E25B5833C}"/>
+                  </a:ext>
+                </a:extLst>
+              </p:cNvPr>
+              <p:cNvSpPr txBox="1">
+                <a:spLocks noRot="1" noChangeAspect="1" noMove="1" noResize="1" noEditPoints="1" noAdjustHandles="1" noChangeArrowheads="1" noChangeShapeType="1" noTextEdit="1"/>
+              </p:cNvSpPr>
+              <p:nvPr/>
+            </p:nvSpPr>
+            <p:spPr>
+              <a:xfrm>
+                <a:off x="18214236" y="15841580"/>
+                <a:ext cx="2890728" cy="490455"/>
+              </a:xfrm>
+              <a:prstGeom prst="rect">
+                <a:avLst/>
+              </a:prstGeom>
+              <a:blipFill>
+                <a:blip r:embed="rId5"/>
+                <a:stretch>
+                  <a:fillRect b="-25641"/>
+                </a:stretch>
+              </a:blipFill>
+            </p:spPr>
+            <p:txBody>
+              <a:bodyPr/>
+              <a:lstStyle/>
+              <a:p>
+                <a:r>
+                  <a:rPr lang="en-US">
+                    <a:noFill/>
+                  </a:rPr>
+                  <a:t> </a:t>
+                </a:r>
+              </a:p>
+            </p:txBody>
+          </p:sp>
+        </mc:Fallback>
+      </mc:AlternateContent>
+      <p:sp>
+        <p:nvSpPr>
+          <p:cNvPr id="44" name="TextBox 43">
+            <a:extLst>
+              <a:ext uri="{FF2B5EF4-FFF2-40B4-BE49-F238E27FC236}">
+                <a16:creationId xmlns:a16="http://schemas.microsoft.com/office/drawing/2014/main" id="{324E7DED-BF95-89DE-336D-A7C078722663}"/>
+              </a:ext>
+            </a:extLst>
+          </p:cNvPr>
+          <p:cNvSpPr txBox="1"/>
+          <p:nvPr/>
+        </p:nvSpPr>
+        <p:spPr>
+          <a:xfrm>
+            <a:off x="19010224" y="16307991"/>
+            <a:ext cx="1298753" cy="490455"/>
+          </a:xfrm>
+          <a:prstGeom prst="rect">
+            <a:avLst/>
+          </a:prstGeom>
+          <a:noFill/>
+        </p:spPr>
+        <p:txBody>
+          <a:bodyPr wrap="none" rtlCol="0">
+            <a:spAutoFit/>
+          </a:bodyPr>
+          <a:lstStyle/>
+          <a:p>
+            <a:r>
+              <a:rPr lang="en-US" dirty="0"/>
+              <a:t>Figure 3</a:t>
+            </a:r>
+          </a:p>
+        </p:txBody>
+      </p:sp>
+      <p:sp>
+        <p:nvSpPr>
+          <p:cNvPr id="47" name="TextBox 46">
+            <a:extLst>
+              <a:ext uri="{FF2B5EF4-FFF2-40B4-BE49-F238E27FC236}">
+                <a16:creationId xmlns:a16="http://schemas.microsoft.com/office/drawing/2014/main" id="{9BC4B949-0449-DB3C-673F-D103A6659C09}"/>
+              </a:ext>
+            </a:extLst>
+          </p:cNvPr>
+          <p:cNvSpPr txBox="1"/>
+          <p:nvPr/>
+        </p:nvSpPr>
+        <p:spPr>
+          <a:xfrm>
+            <a:off x="14180303" y="6531192"/>
+            <a:ext cx="5176193" cy="4471673"/>
+          </a:xfrm>
+          <a:prstGeom prst="rect">
+            <a:avLst/>
+          </a:prstGeom>
+          <a:noFill/>
+        </p:spPr>
+        <p:txBody>
+          <a:bodyPr wrap="square" rtlCol="0">
+            <a:spAutoFit/>
+          </a:bodyPr>
+          <a:lstStyle/>
+          <a:p>
+            <a:r>
+              <a:rPr lang="en-US" dirty="0"/>
+              <a:t>The basis of our object detection depends on reading input from the Terasic TRDB-D5M camera and manipulating the camera module into detecting objects. The camera is connected via GPIO on the FPGA and converts analog data to digital in the form of a Bayer pixel array. The array alternates in a pattern of G1RG1R and BG2BG2 as shown in Figure 1. </a:t>
+            </a:r>
+          </a:p>
+        </p:txBody>
+      </p:sp>
+      <p:sp>
+        <p:nvSpPr>
+          <p:cNvPr id="52" name="TextBox 51">
+            <a:extLst>
+              <a:ext uri="{FF2B5EF4-FFF2-40B4-BE49-F238E27FC236}">
+                <a16:creationId xmlns:a16="http://schemas.microsoft.com/office/drawing/2014/main" id="{0A192E75-5D97-06FE-9F35-6D094DBD0BE6}"/>
+              </a:ext>
+            </a:extLst>
+          </p:cNvPr>
+          <p:cNvSpPr txBox="1"/>
+          <p:nvPr/>
+        </p:nvSpPr>
+        <p:spPr>
+          <a:xfrm>
+            <a:off x="21274596" y="10598054"/>
+            <a:ext cx="1298753" cy="490455"/>
+          </a:xfrm>
+          <a:prstGeom prst="rect">
+            <a:avLst/>
+          </a:prstGeom>
+          <a:noFill/>
+        </p:spPr>
+        <p:txBody>
+          <a:bodyPr wrap="none" rtlCol="0">
+            <a:spAutoFit/>
+          </a:bodyPr>
+          <a:lstStyle/>
+          <a:p>
+            <a:r>
+              <a:rPr lang="en-US" dirty="0"/>
+              <a:t>Figure 1</a:t>
+            </a:r>
+          </a:p>
+        </p:txBody>
+      </p:sp>
+      <p:sp>
+        <p:nvSpPr>
+          <p:cNvPr id="54" name="TextBox 53">
+            <a:extLst>
+              <a:ext uri="{FF2B5EF4-FFF2-40B4-BE49-F238E27FC236}">
+                <a16:creationId xmlns:a16="http://schemas.microsoft.com/office/drawing/2014/main" id="{7B33C8F3-65E3-DFD7-90C1-1407A3CAE874}"/>
+              </a:ext>
+            </a:extLst>
+          </p:cNvPr>
+          <p:cNvSpPr txBox="1"/>
+          <p:nvPr/>
+        </p:nvSpPr>
+        <p:spPr>
+          <a:xfrm>
+            <a:off x="14249400" y="17675094"/>
+            <a:ext cx="12577970" cy="490455"/>
+          </a:xfrm>
+          <a:prstGeom prst="rect">
+            <a:avLst/>
+          </a:prstGeom>
+          <a:noFill/>
+        </p:spPr>
+        <p:txBody>
+          <a:bodyPr wrap="square" rtlCol="0">
+            <a:spAutoFit/>
+          </a:bodyPr>
+          <a:lstStyle/>
+          <a:p>
+            <a:r>
+              <a:rPr lang="en-US" dirty="0"/>
+              <a:t>Blah blah blah talk about the frame storing/differencing diagram</a:t>
+            </a:r>
           </a:p>
         </p:txBody>
       </p:sp>

</xml_diff>

<commit_message>
nathan's  updates to the poster
</commit_message>
<xml_diff>
--- a/554_Poster.pptx
+++ b/554_Poster.pptx
@@ -3426,7 +3426,7 @@
                 <a:latin typeface="Arial" panose="020B0604020202020204" pitchFamily="34" charset="0"/>
                 <a:cs typeface="Arial" panose="020B0604020202020204" pitchFamily="34" charset="0"/>
               </a:rPr>
-              <a:t>Object Detection</a:t>
+              <a:t>Translation Layer</a:t>
             </a:r>
           </a:p>
         </p:txBody>
@@ -4331,8 +4331,8 @@
           </a:p>
         </p:txBody>
       </p:sp>
-      <mc:AlternateContent xmlns:mc="http://schemas.openxmlformats.org/markup-compatibility/2006">
-        <mc:Choice xmlns:a14="http://schemas.microsoft.com/office/drawing/2010/main" Requires="a14">
+      <mc:AlternateContent xmlns:mc="http://schemas.openxmlformats.org/markup-compatibility/2006" xmlns:a14="http://schemas.microsoft.com/office/drawing/2010/main">
+        <mc:Choice Requires="a14">
           <p:sp>
             <p:nvSpPr>
               <p:cNvPr id="42" name="TextBox 41">
@@ -4361,6 +4361,7 @@
               </a:bodyPr>
               <a:lstStyle/>
               <a:p>
+                <a:pPr/>
                 <a14:m>
                   <m:oMathPara xmlns:m="http://schemas.openxmlformats.org/officeDocument/2006/math">
                     <m:oMathParaPr>
@@ -4393,7 +4394,7 @@
             </p:txBody>
           </p:sp>
         </mc:Choice>
-        <mc:Fallback>
+        <mc:Fallback xmlns="">
           <p:sp>
             <p:nvSpPr>
               <p:cNvPr id="42" name="TextBox 41">
@@ -4574,6 +4575,630 @@
             <a:r>
               <a:rPr lang="en-US" dirty="0"/>
               <a:t>Blah blah blah talk about the frame storing/differencing diagram</a:t>
+            </a:r>
+          </a:p>
+        </p:txBody>
+      </p:sp>
+      <p:pic>
+        <p:nvPicPr>
+          <p:cNvPr id="6" name="Picture 5" descr="A black and white drawing of a box&#10;&#10;AI-generated content may be incorrect.">
+            <a:extLst>
+              <a:ext uri="{FF2B5EF4-FFF2-40B4-BE49-F238E27FC236}">
+                <a16:creationId xmlns:a16="http://schemas.microsoft.com/office/drawing/2014/main" id="{A6DC86F8-773E-A44E-CABB-17009DF29169}"/>
+              </a:ext>
+            </a:extLst>
+          </p:cNvPr>
+          <p:cNvPicPr>
+            <a:picLocks noChangeAspect="1"/>
+          </p:cNvPicPr>
+          <p:nvPr/>
+        </p:nvPicPr>
+        <p:blipFill>
+          <a:blip r:embed="rId6"/>
+          <a:stretch>
+            <a:fillRect/>
+          </a:stretch>
+        </p:blipFill>
+        <p:spPr>
+          <a:xfrm>
+            <a:off x="26184855" y="13474510"/>
+            <a:ext cx="2480810" cy="2549721"/>
+          </a:xfrm>
+          <a:prstGeom prst="rect">
+            <a:avLst/>
+          </a:prstGeom>
+        </p:spPr>
+      </p:pic>
+      <p:pic>
+        <p:nvPicPr>
+          <p:cNvPr id="1026" name="Picture 2">
+            <a:extLst>
+              <a:ext uri="{FF2B5EF4-FFF2-40B4-BE49-F238E27FC236}">
+                <a16:creationId xmlns:a16="http://schemas.microsoft.com/office/drawing/2014/main" id="{54499E91-599E-3980-AED6-FC04D805571C}"/>
+              </a:ext>
+            </a:extLst>
+          </p:cNvPr>
+          <p:cNvPicPr>
+            <a:picLocks noChangeAspect="1" noChangeArrowheads="1"/>
+          </p:cNvPicPr>
+          <p:nvPr/>
+        </p:nvPicPr>
+        <p:blipFill>
+          <a:blip r:embed="rId7">
+            <a:extLst>
+              <a:ext uri="{28A0092B-C50C-407E-A947-70E740481C1C}">
+                <a14:useLocalDpi xmlns:a14="http://schemas.microsoft.com/office/drawing/2010/main" val="0"/>
+              </a:ext>
+            </a:extLst>
+          </a:blip>
+          <a:srcRect/>
+          <a:stretch>
+            <a:fillRect/>
+          </a:stretch>
+        </p:blipFill>
+        <p:spPr bwMode="auto">
+          <a:xfrm>
+            <a:off x="35512298" y="10956869"/>
+            <a:ext cx="2263379" cy="2330710"/>
+          </a:xfrm>
+          <a:prstGeom prst="rect">
+            <a:avLst/>
+          </a:prstGeom>
+          <a:noFill/>
+          <a:extLst>
+            <a:ext uri="{909E8E84-426E-40DD-AFC4-6F175D3DCCD1}">
+              <a14:hiddenFill xmlns:a14="http://schemas.microsoft.com/office/drawing/2010/main">
+                <a:solidFill>
+                  <a:srgbClr val="FFFFFF"/>
+                </a:solidFill>
+              </a14:hiddenFill>
+            </a:ext>
+          </a:extLst>
+        </p:spPr>
+      </p:pic>
+      <p:pic>
+        <p:nvPicPr>
+          <p:cNvPr id="1034" name="Picture 10">
+            <a:extLst>
+              <a:ext uri="{FF2B5EF4-FFF2-40B4-BE49-F238E27FC236}">
+                <a16:creationId xmlns:a16="http://schemas.microsoft.com/office/drawing/2014/main" id="{879648D1-C232-50A0-CCBC-3177D4DD917C}"/>
+              </a:ext>
+            </a:extLst>
+          </p:cNvPr>
+          <p:cNvPicPr>
+            <a:picLocks noChangeAspect="1" noChangeArrowheads="1"/>
+          </p:cNvPicPr>
+          <p:nvPr/>
+        </p:nvPicPr>
+        <p:blipFill>
+          <a:blip r:embed="rId8">
+            <a:extLst>
+              <a:ext uri="{28A0092B-C50C-407E-A947-70E740481C1C}">
+                <a14:useLocalDpi xmlns:a14="http://schemas.microsoft.com/office/drawing/2010/main" val="0"/>
+              </a:ext>
+            </a:extLst>
+          </a:blip>
+          <a:srcRect/>
+          <a:stretch>
+            <a:fillRect/>
+          </a:stretch>
+        </p:blipFill>
+        <p:spPr bwMode="auto">
+          <a:xfrm>
+            <a:off x="26157528" y="24844314"/>
+            <a:ext cx="12063235" cy="2243762"/>
+          </a:xfrm>
+          <a:prstGeom prst="rect">
+            <a:avLst/>
+          </a:prstGeom>
+          <a:noFill/>
+          <a:extLst>
+            <a:ext uri="{909E8E84-426E-40DD-AFC4-6F175D3DCCD1}">
+              <a14:hiddenFill xmlns:a14="http://schemas.microsoft.com/office/drawing/2010/main">
+                <a:solidFill>
+                  <a:srgbClr val="FFFFFF"/>
+                </a:solidFill>
+              </a14:hiddenFill>
+            </a:ext>
+          </a:extLst>
+        </p:spPr>
+      </p:pic>
+      <p:pic>
+        <p:nvPicPr>
+          <p:cNvPr id="1036" name="Picture 12" descr="TerasIC D5M - Kamami on-line store">
+            <a:extLst>
+              <a:ext uri="{FF2B5EF4-FFF2-40B4-BE49-F238E27FC236}">
+                <a16:creationId xmlns:a16="http://schemas.microsoft.com/office/drawing/2014/main" id="{750E7ECA-B428-8939-0255-039B9F1382B9}"/>
+              </a:ext>
+            </a:extLst>
+          </p:cNvPr>
+          <p:cNvPicPr>
+            <a:picLocks noChangeAspect="1" noChangeArrowheads="1"/>
+          </p:cNvPicPr>
+          <p:nvPr/>
+        </p:nvPicPr>
+        <p:blipFill rotWithShape="1">
+          <a:blip r:embed="rId9">
+            <a:extLst>
+              <a:ext uri="{28A0092B-C50C-407E-A947-70E740481C1C}">
+                <a14:useLocalDpi xmlns:a14="http://schemas.microsoft.com/office/drawing/2010/main" val="0"/>
+              </a:ext>
+            </a:extLst>
+          </a:blip>
+          <a:srcRect l="6611" t="6166" r="10257" b="6447"/>
+          <a:stretch/>
+        </p:blipFill>
+        <p:spPr bwMode="auto">
+          <a:xfrm>
+            <a:off x="28683946" y="13499333"/>
+            <a:ext cx="2401938" cy="2524898"/>
+          </a:xfrm>
+          <a:prstGeom prst="rect">
+            <a:avLst/>
+          </a:prstGeom>
+          <a:noFill/>
+          <a:extLst>
+            <a:ext uri="{909E8E84-426E-40DD-AFC4-6F175D3DCCD1}">
+              <a14:hiddenFill xmlns:a14="http://schemas.microsoft.com/office/drawing/2010/main">
+                <a:solidFill>
+                  <a:srgbClr val="FFFFFF"/>
+                </a:solidFill>
+              </a14:hiddenFill>
+            </a:ext>
+          </a:extLst>
+        </p:spPr>
+      </p:pic>
+      <p:sp>
+        <p:nvSpPr>
+          <p:cNvPr id="18" name="TextBox 17">
+            <a:extLst>
+              <a:ext uri="{FF2B5EF4-FFF2-40B4-BE49-F238E27FC236}">
+                <a16:creationId xmlns:a16="http://schemas.microsoft.com/office/drawing/2014/main" id="{67AE14C5-8215-E4D5-CB6C-9106E3534977}"/>
+              </a:ext>
+            </a:extLst>
+          </p:cNvPr>
+          <p:cNvSpPr txBox="1"/>
+          <p:nvPr/>
+        </p:nvSpPr>
+        <p:spPr>
+          <a:xfrm>
+            <a:off x="26240621" y="6497047"/>
+            <a:ext cx="12127318" cy="888577"/>
+          </a:xfrm>
+          <a:prstGeom prst="rect">
+            <a:avLst/>
+          </a:prstGeom>
+          <a:noFill/>
+        </p:spPr>
+        <p:txBody>
+          <a:bodyPr wrap="square" rtlCol="0">
+            <a:spAutoFit/>
+          </a:bodyPr>
+          <a:lstStyle/>
+          <a:p>
+            <a:r>
+              <a:rPr lang="en-US" dirty="0"/>
+              <a:t>In order to make this project possible, a handful of hardware and peripherals were required. All peripherals are interfaced through GPIO signal pins. </a:t>
+            </a:r>
+          </a:p>
+        </p:txBody>
+      </p:sp>
+      <p:pic>
+        <p:nvPicPr>
+          <p:cNvPr id="20" name="Picture 19">
+            <a:extLst>
+              <a:ext uri="{FF2B5EF4-FFF2-40B4-BE49-F238E27FC236}">
+                <a16:creationId xmlns:a16="http://schemas.microsoft.com/office/drawing/2014/main" id="{9B9190DE-D21F-C47A-6C90-F6A6D17BD5FC}"/>
+              </a:ext>
+            </a:extLst>
+          </p:cNvPr>
+          <p:cNvPicPr>
+            <a:picLocks noChangeAspect="1"/>
+          </p:cNvPicPr>
+          <p:nvPr/>
+        </p:nvPicPr>
+        <p:blipFill>
+          <a:blip r:embed="rId10"/>
+          <a:stretch>
+            <a:fillRect/>
+          </a:stretch>
+        </p:blipFill>
+        <p:spPr>
+          <a:xfrm>
+            <a:off x="26215335" y="7374803"/>
+            <a:ext cx="5880715" cy="4088081"/>
+          </a:xfrm>
+          <a:prstGeom prst="rect">
+            <a:avLst/>
+          </a:prstGeom>
+        </p:spPr>
+      </p:pic>
+      <p:sp>
+        <p:nvSpPr>
+          <p:cNvPr id="21" name="TextBox 20">
+            <a:extLst>
+              <a:ext uri="{FF2B5EF4-FFF2-40B4-BE49-F238E27FC236}">
+                <a16:creationId xmlns:a16="http://schemas.microsoft.com/office/drawing/2014/main" id="{B98D9A59-DB4E-67C9-6777-49D522F0D4C9}"/>
+              </a:ext>
+            </a:extLst>
+          </p:cNvPr>
+          <p:cNvSpPr txBox="1"/>
+          <p:nvPr/>
+        </p:nvSpPr>
+        <p:spPr>
+          <a:xfrm>
+            <a:off x="32070944" y="7623170"/>
+            <a:ext cx="6261269" cy="3277307"/>
+          </a:xfrm>
+          <a:prstGeom prst="rect">
+            <a:avLst/>
+          </a:prstGeom>
+          <a:noFill/>
+        </p:spPr>
+        <p:txBody>
+          <a:bodyPr wrap="square" rtlCol="0">
+            <a:spAutoFit/>
+          </a:bodyPr>
+          <a:lstStyle/>
+          <a:p>
+            <a:r>
+              <a:rPr lang="en-US" b="1" dirty="0"/>
+              <a:t>Logic Level Shifter:</a:t>
+            </a:r>
+          </a:p>
+          <a:p>
+            <a:r>
+              <a:rPr lang="en-US" dirty="0"/>
+              <a:t>In support of FPGA logic, we were required to implement an external digital circuit to step-up the PWM logic levels for the servos. Due to the physical limitation of the FPGA’s GPIO output maximum voltage-current rating being set to 3.3V/1.5A, we were not able to drive the servo motors to their demanded 5V.</a:t>
+            </a:r>
+          </a:p>
+        </p:txBody>
+      </p:sp>
+      <p:sp>
+        <p:nvSpPr>
+          <p:cNvPr id="26" name="TextBox 25">
+            <a:extLst>
+              <a:ext uri="{FF2B5EF4-FFF2-40B4-BE49-F238E27FC236}">
+                <a16:creationId xmlns:a16="http://schemas.microsoft.com/office/drawing/2014/main" id="{BB86D6AE-9842-965D-936E-43E94391B2FB}"/>
+              </a:ext>
+            </a:extLst>
+          </p:cNvPr>
+          <p:cNvSpPr txBox="1"/>
+          <p:nvPr/>
+        </p:nvSpPr>
+        <p:spPr>
+          <a:xfrm>
+            <a:off x="26225955" y="11572958"/>
+            <a:ext cx="9352715" cy="1684820"/>
+          </a:xfrm>
+          <a:prstGeom prst="rect">
+            <a:avLst/>
+          </a:prstGeom>
+          <a:noFill/>
+        </p:spPr>
+        <p:txBody>
+          <a:bodyPr wrap="square" rtlCol="0">
+            <a:spAutoFit/>
+          </a:bodyPr>
+          <a:lstStyle/>
+          <a:p>
+            <a:r>
+              <a:rPr lang="en-US" dirty="0"/>
+              <a:t>Additionally, this project integrated an off-the-shelf pan-tilt servo mount composed of two SG90 servo motors. One motor is responsible for moving in the horizontal direction, while the other controls the vertical position. As shown in the picture to the right</a:t>
+            </a:r>
+          </a:p>
+        </p:txBody>
+      </p:sp>
+      <p:sp>
+        <p:nvSpPr>
+          <p:cNvPr id="27" name="TextBox 26">
+            <a:extLst>
+              <a:ext uri="{FF2B5EF4-FFF2-40B4-BE49-F238E27FC236}">
+                <a16:creationId xmlns:a16="http://schemas.microsoft.com/office/drawing/2014/main" id="{358D8D76-BB62-47AA-9408-EB7DDF4F4557}"/>
+              </a:ext>
+            </a:extLst>
+          </p:cNvPr>
+          <p:cNvSpPr txBox="1"/>
+          <p:nvPr/>
+        </p:nvSpPr>
+        <p:spPr>
+          <a:xfrm>
+            <a:off x="27027474" y="10972800"/>
+            <a:ext cx="4253945" cy="369332"/>
+          </a:xfrm>
+          <a:prstGeom prst="rect">
+            <a:avLst/>
+          </a:prstGeom>
+          <a:noFill/>
+        </p:spPr>
+        <p:txBody>
+          <a:bodyPr wrap="square" rtlCol="0">
+            <a:spAutoFit/>
+          </a:bodyPr>
+          <a:lstStyle/>
+          <a:p>
+            <a:r>
+              <a:rPr lang="en-US" sz="1800" dirty="0"/>
+              <a:t>Logic Level Shifter High Level Schematic</a:t>
+            </a:r>
+          </a:p>
+        </p:txBody>
+      </p:sp>
+      <p:sp>
+        <p:nvSpPr>
+          <p:cNvPr id="31" name="TextBox 30">
+            <a:extLst>
+              <a:ext uri="{FF2B5EF4-FFF2-40B4-BE49-F238E27FC236}">
+                <a16:creationId xmlns:a16="http://schemas.microsoft.com/office/drawing/2014/main" id="{83E4CD49-600F-963C-AAC9-6EA9FAC88C47}"/>
+              </a:ext>
+            </a:extLst>
+          </p:cNvPr>
+          <p:cNvSpPr txBox="1"/>
+          <p:nvPr/>
+        </p:nvSpPr>
+        <p:spPr>
+          <a:xfrm>
+            <a:off x="26157529" y="19050000"/>
+            <a:ext cx="7225076" cy="3675430"/>
+          </a:xfrm>
+          <a:prstGeom prst="rect">
+            <a:avLst/>
+          </a:prstGeom>
+          <a:noFill/>
+        </p:spPr>
+        <p:txBody>
+          <a:bodyPr wrap="square" rtlCol="0">
+            <a:spAutoFit/>
+          </a:bodyPr>
+          <a:lstStyle/>
+          <a:p>
+            <a:r>
+              <a:rPr lang="en-US" dirty="0"/>
+              <a:t>To control the servos, the team decided to assemble servo driver modules to make their control simplified regardless of how position was communicated from image processing. The image to the right briefly describes how a servo motors PMW signal should be structured to achieve the desired servo horn position. The bounds of this specification were the motivating factoid to our servo driver. The formula relating servo horn position to duty cycle can be seen here:</a:t>
+            </a:r>
+          </a:p>
+        </p:txBody>
+      </p:sp>
+      <p:pic>
+        <p:nvPicPr>
+          <p:cNvPr id="1042" name="Picture 18" descr="Controlling Servo Motor with Stm32f103 microcontroller using stm32cubemx  code configurator by STMicroelectronics and keil uvision 5 ide for cortex  m1 series microcontrollers">
+            <a:extLst>
+              <a:ext uri="{FF2B5EF4-FFF2-40B4-BE49-F238E27FC236}">
+                <a16:creationId xmlns:a16="http://schemas.microsoft.com/office/drawing/2014/main" id="{094E42B9-04FC-E419-C412-62DF83ED953A}"/>
+              </a:ext>
+            </a:extLst>
+          </p:cNvPr>
+          <p:cNvPicPr>
+            <a:picLocks noChangeAspect="1" noChangeArrowheads="1"/>
+          </p:cNvPicPr>
+          <p:nvPr/>
+        </p:nvPicPr>
+        <p:blipFill rotWithShape="1">
+          <a:blip r:embed="rId11">
+            <a:extLst>
+              <a:ext uri="{28A0092B-C50C-407E-A947-70E740481C1C}">
+                <a14:useLocalDpi xmlns:a14="http://schemas.microsoft.com/office/drawing/2010/main" val="0"/>
+              </a:ext>
+            </a:extLst>
+          </a:blip>
+          <a:srcRect t="10569"/>
+          <a:stretch/>
+        </p:blipFill>
+        <p:spPr bwMode="auto">
+          <a:xfrm>
+            <a:off x="33397844" y="19416308"/>
+            <a:ext cx="4955978" cy="3064413"/>
+          </a:xfrm>
+          <a:prstGeom prst="rect">
+            <a:avLst/>
+          </a:prstGeom>
+          <a:noFill/>
+          <a:extLst>
+            <a:ext uri="{909E8E84-426E-40DD-AFC4-6F175D3DCCD1}">
+              <a14:hiddenFill xmlns:a14="http://schemas.microsoft.com/office/drawing/2010/main">
+                <a:solidFill>
+                  <a:srgbClr val="FFFFFF"/>
+                </a:solidFill>
+              </a14:hiddenFill>
+            </a:ext>
+          </a:extLst>
+        </p:spPr>
+      </p:pic>
+      <p:sp>
+        <p:nvSpPr>
+          <p:cNvPr id="32" name="TextBox 31">
+            <a:extLst>
+              <a:ext uri="{FF2B5EF4-FFF2-40B4-BE49-F238E27FC236}">
+                <a16:creationId xmlns:a16="http://schemas.microsoft.com/office/drawing/2014/main" id="{E83E6CD0-7DFF-656F-55AA-BD6564034161}"/>
+              </a:ext>
+            </a:extLst>
+          </p:cNvPr>
+          <p:cNvSpPr txBox="1"/>
+          <p:nvPr/>
+        </p:nvSpPr>
+        <p:spPr>
+          <a:xfrm>
+            <a:off x="26089593" y="27228774"/>
+            <a:ext cx="12207815" cy="3675430"/>
+          </a:xfrm>
+          <a:prstGeom prst="rect">
+            <a:avLst/>
+          </a:prstGeom>
+          <a:noFill/>
+        </p:spPr>
+        <p:txBody>
+          <a:bodyPr wrap="square" rtlCol="0">
+            <a:spAutoFit/>
+          </a:bodyPr>
+          <a:lstStyle/>
+          <a:p>
+            <a:r>
+              <a:rPr lang="en-US" dirty="0"/>
+              <a:t>Furthermore, the driver modules are parametrized to enable “overclocking” of the PWM signal frequency. Since the duty cycle, or the high pulse, of the period is constant (</a:t>
+            </a:r>
+            <a:r>
+              <a:rPr lang="en-US" dirty="0" err="1"/>
+              <a:t>i.e</a:t>
+            </a:r>
+            <a:r>
+              <a:rPr lang="en-US" dirty="0"/>
+              <a:t> 1ms for 0 degrees and 2ms for 180 degrees) we can shorten the low pulse of the period. This low period is in place to allow the internal comparator of the servo to correct its position. However, within in our application, the servo is </a:t>
+            </a:r>
+            <a:r>
+              <a:rPr lang="en-US" i="1" dirty="0"/>
+              <a:t>constantly</a:t>
+            </a:r>
+            <a:r>
+              <a:rPr lang="en-US" dirty="0"/>
+              <a:t> receiving new positional commands and thus we can afford the sacrifice in accuracy of position in exchange for greater speeds. For reference, typical hobbyist servo motors operate at 50Hz (hence the 20ms period in the image above). In this application, we were able to push our servos closer to 100Hz with no apparent fallbacks on accuracy.</a:t>
+            </a:r>
+          </a:p>
+        </p:txBody>
+      </p:sp>
+      <p:sp>
+        <p:nvSpPr>
+          <p:cNvPr id="38" name="TextBox 37">
+            <a:extLst>
+              <a:ext uri="{FF2B5EF4-FFF2-40B4-BE49-F238E27FC236}">
+                <a16:creationId xmlns:a16="http://schemas.microsoft.com/office/drawing/2014/main" id="{A9E48EF5-526D-BCD5-C5FF-5ED2B892EB68}"/>
+              </a:ext>
+            </a:extLst>
+          </p:cNvPr>
+          <p:cNvSpPr txBox="1"/>
+          <p:nvPr/>
+        </p:nvSpPr>
+        <p:spPr>
+          <a:xfrm>
+            <a:off x="26827370" y="22793980"/>
+            <a:ext cx="8245028" cy="523220"/>
+          </a:xfrm>
+          <a:prstGeom prst="rect">
+            <a:avLst/>
+          </a:prstGeom>
+          <a:noFill/>
+        </p:spPr>
+        <p:txBody>
+          <a:bodyPr wrap="square" rtlCol="0">
+            <a:spAutoFit/>
+          </a:bodyPr>
+          <a:lstStyle/>
+          <a:p>
+            <a:r>
+              <a:rPr lang="en-US" sz="2800" dirty="0"/>
+              <a:t>Duty Cycle = 1000 + ( (</a:t>
+            </a:r>
+            <a:r>
+              <a:rPr lang="en-US" sz="2800" dirty="0" err="1"/>
+              <a:t>degree_val</a:t>
+            </a:r>
+            <a:r>
+              <a:rPr lang="en-US" sz="2800" dirty="0"/>
+              <a:t> * 1000.00) / 180)</a:t>
+            </a:r>
+          </a:p>
+        </p:txBody>
+      </p:sp>
+      <p:sp>
+        <p:nvSpPr>
+          <p:cNvPr id="39" name="TextBox 38">
+            <a:extLst>
+              <a:ext uri="{FF2B5EF4-FFF2-40B4-BE49-F238E27FC236}">
+                <a16:creationId xmlns:a16="http://schemas.microsoft.com/office/drawing/2014/main" id="{667BF0A6-2D44-D785-1D19-7B33B9F03104}"/>
+              </a:ext>
+            </a:extLst>
+          </p:cNvPr>
+          <p:cNvSpPr txBox="1"/>
+          <p:nvPr/>
+        </p:nvSpPr>
+        <p:spPr>
+          <a:xfrm>
+            <a:off x="26157528" y="23474764"/>
+            <a:ext cx="12477953" cy="1286699"/>
+          </a:xfrm>
+          <a:prstGeom prst="rect">
+            <a:avLst/>
+          </a:prstGeom>
+          <a:noFill/>
+        </p:spPr>
+        <p:txBody>
+          <a:bodyPr wrap="square" rtlCol="0">
+            <a:spAutoFit/>
+          </a:bodyPr>
+          <a:lstStyle/>
+          <a:p>
+            <a:r>
+              <a:rPr lang="en-US" dirty="0"/>
+              <a:t>The resulting duty cycle has units of microseconds, this ultimately gives a greater degree of accuracy than if we used floating point or another means of data representation. Successful simulation waveforms can be seen below highlighting the duty cycles from the image above</a:t>
+            </a:r>
+          </a:p>
+        </p:txBody>
+      </p:sp>
+      <p:sp>
+        <p:nvSpPr>
+          <p:cNvPr id="40" name="TextBox 39">
+            <a:extLst>
+              <a:ext uri="{FF2B5EF4-FFF2-40B4-BE49-F238E27FC236}">
+                <a16:creationId xmlns:a16="http://schemas.microsoft.com/office/drawing/2014/main" id="{0754D891-4F94-1DEC-0AC9-4088E260C835}"/>
+              </a:ext>
+            </a:extLst>
+          </p:cNvPr>
+          <p:cNvSpPr txBox="1"/>
+          <p:nvPr/>
+        </p:nvSpPr>
+        <p:spPr>
+          <a:xfrm>
+            <a:off x="31056644" y="13423835"/>
+            <a:ext cx="7134879" cy="2481064"/>
+          </a:xfrm>
+          <a:prstGeom prst="rect">
+            <a:avLst/>
+          </a:prstGeom>
+          <a:noFill/>
+        </p:spPr>
+        <p:txBody>
+          <a:bodyPr wrap="square" rtlCol="0">
+            <a:spAutoFit/>
+          </a:bodyPr>
+          <a:lstStyle/>
+          <a:p>
+            <a:r>
+              <a:rPr lang="en-US" dirty="0"/>
+              <a:t>One of the important hardware components of our project was aligning the camera and laser setup so they were relatively in the same spatial planes. Therefore, the team decided to 3D model a mount for both the camera and the pan-tilt servo apparatus. The model was 3D printed at the Makerspace.</a:t>
+            </a:r>
+          </a:p>
+        </p:txBody>
+      </p:sp>
+      <p:sp>
+        <p:nvSpPr>
+          <p:cNvPr id="41" name="TextBox 40">
+            <a:extLst>
+              <a:ext uri="{FF2B5EF4-FFF2-40B4-BE49-F238E27FC236}">
+                <a16:creationId xmlns:a16="http://schemas.microsoft.com/office/drawing/2014/main" id="{4369E505-92F5-FAFC-DA19-D9940FB0E2A3}"/>
+              </a:ext>
+            </a:extLst>
+          </p:cNvPr>
+          <p:cNvSpPr txBox="1"/>
+          <p:nvPr/>
+        </p:nvSpPr>
+        <p:spPr>
+          <a:xfrm>
+            <a:off x="26103984" y="16053247"/>
+            <a:ext cx="12087539" cy="1286699"/>
+          </a:xfrm>
+          <a:prstGeom prst="rect">
+            <a:avLst/>
+          </a:prstGeom>
+          <a:noFill/>
+        </p:spPr>
+        <p:txBody>
+          <a:bodyPr wrap="square" rtlCol="0">
+            <a:spAutoFit/>
+          </a:bodyPr>
+          <a:lstStyle/>
+          <a:p>
+            <a:r>
+              <a:rPr lang="en-US" dirty="0"/>
+              <a:t>The project also made use of an off the shelf laser module for assigning the directionality of the system. We decided this sufficiently emulated the targeting nature of the system without using a projectile.</a:t>
             </a:r>
           </a:p>
         </p:txBody>

</xml_diff>